<commit_message>
removed last slide cause of time
</commit_message>
<xml_diff>
--- a/documents/FingerTrees.pptx
+++ b/documents/FingerTrees.pptx
@@ -5,7 +5,7 @@
     <p:sldMasterId id="2147483659" r:id="rId1"/>
   </p:sldMasterIdLst>
   <p:notesMasterIdLst>
-    <p:notesMasterId r:id="rId20"/>
+    <p:notesMasterId r:id="rId19"/>
   </p:notesMasterIdLst>
   <p:sldIdLst>
     <p:sldId id="256" r:id="rId2"/>
@@ -25,22 +25,21 @@
     <p:sldId id="273" r:id="rId16"/>
     <p:sldId id="285" r:id="rId17"/>
     <p:sldId id="265" r:id="rId18"/>
-    <p:sldId id="277" r:id="rId19"/>
   </p:sldIdLst>
   <p:sldSz cx="9144000" cy="5143500" type="screen16x9"/>
   <p:notesSz cx="6858000" cy="9144000"/>
   <p:embeddedFontLst>
     <p:embeddedFont>
       <p:font typeface="Roboto" panose="02000000000000000000" pitchFamily="2" charset="0"/>
-      <p:regular r:id="rId21"/>
-      <p:bold r:id="rId22"/>
-      <p:italic r:id="rId23"/>
-      <p:boldItalic r:id="rId24"/>
+      <p:regular r:id="rId20"/>
+      <p:bold r:id="rId21"/>
+      <p:italic r:id="rId22"/>
+      <p:boldItalic r:id="rId23"/>
     </p:embeddedFont>
     <p:embeddedFont>
       <p:font typeface="Roboto Slab" pitchFamily="2" charset="0"/>
-      <p:regular r:id="rId25"/>
-      <p:bold r:id="rId26"/>
+      <p:regular r:id="rId24"/>
+      <p:bold r:id="rId25"/>
     </p:embeddedFont>
   </p:embeddedFontLst>
   <p:defaultTextStyle>
@@ -2340,92 +2339,6 @@
         </p:txBody>
       </p:sp>
     </p:spTree>
-  </p:cSld>
-  <p:clrMapOvr>
-    <a:masterClrMapping/>
-  </p:clrMapOvr>
-</p:notes>
-</file>
-
-<file path=ppt/notesSlides/notesSlide18.xml><?xml version="1.0" encoding="utf-8"?>
-<p:notes xmlns:a="http://schemas.openxmlformats.org/drawingml/2006/main" xmlns:r="http://schemas.openxmlformats.org/officeDocument/2006/relationships" xmlns:p="http://schemas.openxmlformats.org/presentationml/2006/main">
-  <p:cSld>
-    <p:spTree>
-      <p:nvGrpSpPr>
-        <p:cNvPr id="1" name=""/>
-        <p:cNvGrpSpPr/>
-        <p:nvPr/>
-      </p:nvGrpSpPr>
-      <p:grpSpPr>
-        <a:xfrm>
-          <a:off x="0" y="0"/>
-          <a:ext cx="0" cy="0"/>
-          <a:chOff x="0" y="0"/>
-          <a:chExt cx="0" cy="0"/>
-        </a:xfrm>
-      </p:grpSpPr>
-      <p:sp>
-        <p:nvSpPr>
-          <p:cNvPr id="2" name="Folienbildplatzhalter 1"/>
-          <p:cNvSpPr>
-            <a:spLocks noGrp="1" noRot="1" noChangeAspect="1"/>
-          </p:cNvSpPr>
-          <p:nvPr>
-            <p:ph type="sldImg"/>
-          </p:nvPr>
-        </p:nvSpPr>
-        <p:spPr>
-          <a:xfrm>
-            <a:off x="381000" y="685800"/>
-            <a:ext cx="6096000" cy="3429000"/>
-          </a:xfrm>
-        </p:spPr>
-      </p:sp>
-      <p:sp>
-        <p:nvSpPr>
-          <p:cNvPr id="3" name="Notizenplatzhalter 2"/>
-          <p:cNvSpPr>
-            <a:spLocks noGrp="1"/>
-          </p:cNvSpPr>
-          <p:nvPr>
-            <p:ph type="body" idx="1"/>
-          </p:nvPr>
-        </p:nvSpPr>
-        <p:spPr/>
-        <p:txBody>
-          <a:bodyPr/>
-          <a:lstStyle/>
-          <a:p>
-            <a:r>
-              <a:rPr lang="de-DE" dirty="0"/>
-              <a:t>@unchecked = Compiler ignoriert den check </a:t>
-            </a:r>
-          </a:p>
-          <a:p>
-            <a:r>
-              <a:rPr lang="de-DE" dirty="0"/>
-              <a:t>Nil = Ende / Leere Liste</a:t>
-            </a:r>
-          </a:p>
-          <a:p>
-            <a:r>
-              <a:rPr lang="de-DE" dirty="0"/>
-              <a:t>:: </a:t>
-            </a:r>
-            <a:r>
-              <a:rPr lang="de-DE" dirty="0" err="1"/>
-              <a:t>prepend</a:t>
-            </a:r>
-            <a:endParaRPr lang="de-DE" dirty="0"/>
-          </a:p>
-        </p:txBody>
-      </p:sp>
-    </p:spTree>
-    <p:extLst>
-      <p:ext uri="{BB962C8B-B14F-4D97-AF65-F5344CB8AC3E}">
-        <p14:creationId xmlns:p14="http://schemas.microsoft.com/office/powerpoint/2010/main" val="1191258858"/>
-      </p:ext>
-    </p:extLst>
   </p:cSld>
   <p:clrMapOvr>
     <a:masterClrMapping/>
@@ -10403,94 +10316,6 @@
 </p:sld>
 </file>
 
-<file path=ppt/slides/slide18.xml><?xml version="1.0" encoding="utf-8"?>
-<p:sld xmlns:a="http://schemas.openxmlformats.org/drawingml/2006/main" xmlns:r="http://schemas.openxmlformats.org/officeDocument/2006/relationships" xmlns:p="http://schemas.openxmlformats.org/presentationml/2006/main">
-  <p:cSld>
-    <p:spTree>
-      <p:nvGrpSpPr>
-        <p:cNvPr id="1" name=""/>
-        <p:cNvGrpSpPr/>
-        <p:nvPr/>
-      </p:nvGrpSpPr>
-      <p:grpSpPr>
-        <a:xfrm>
-          <a:off x="0" y="0"/>
-          <a:ext cx="0" cy="0"/>
-          <a:chOff x="0" y="0"/>
-          <a:chExt cx="0" cy="0"/>
-        </a:xfrm>
-      </p:grpSpPr>
-      <p:sp>
-        <p:nvSpPr>
-          <p:cNvPr id="2" name="Titel 1">
-            <a:extLst>
-              <a:ext uri="{FF2B5EF4-FFF2-40B4-BE49-F238E27FC236}">
-                <a16:creationId xmlns:a16="http://schemas.microsoft.com/office/drawing/2014/main" id="{0933B6F0-73A2-A1CD-EB4D-0DACCE2C467C}"/>
-              </a:ext>
-            </a:extLst>
-          </p:cNvPr>
-          <p:cNvSpPr>
-            <a:spLocks noGrp="1"/>
-          </p:cNvSpPr>
-          <p:nvPr>
-            <p:ph type="title"/>
-          </p:nvPr>
-        </p:nvSpPr>
-        <p:spPr/>
-        <p:txBody>
-          <a:bodyPr/>
-          <a:lstStyle/>
-          <a:p>
-            <a:r>
-              <a:rPr lang="de-DE" dirty="0"/>
-              <a:t>Das Arbeiten mit Listen</a:t>
-            </a:r>
-          </a:p>
-        </p:txBody>
-      </p:sp>
-      <p:pic>
-        <p:nvPicPr>
-          <p:cNvPr id="4" name="Grafik 3">
-            <a:extLst>
-              <a:ext uri="{FF2B5EF4-FFF2-40B4-BE49-F238E27FC236}">
-                <a16:creationId xmlns:a16="http://schemas.microsoft.com/office/drawing/2014/main" id="{F6449214-A8FA-D082-E792-02F7B546B11D}"/>
-              </a:ext>
-            </a:extLst>
-          </p:cNvPr>
-          <p:cNvPicPr>
-            <a:picLocks noChangeAspect="1"/>
-          </p:cNvPicPr>
-          <p:nvPr/>
-        </p:nvPicPr>
-        <p:blipFill>
-          <a:blip r:embed="rId3"/>
-          <a:stretch>
-            <a:fillRect/>
-          </a:stretch>
-        </p:blipFill>
-        <p:spPr>
-          <a:xfrm>
-            <a:off x="0" y="1533600"/>
-            <a:ext cx="9144000" cy="3151875"/>
-          </a:xfrm>
-          <a:prstGeom prst="rect">
-            <a:avLst/>
-          </a:prstGeom>
-        </p:spPr>
-      </p:pic>
-    </p:spTree>
-    <p:extLst>
-      <p:ext uri="{BB962C8B-B14F-4D97-AF65-F5344CB8AC3E}">
-        <p14:creationId xmlns:p14="http://schemas.microsoft.com/office/powerpoint/2010/main" val="53727958"/>
-      </p:ext>
-    </p:extLst>
-  </p:cSld>
-  <p:clrMapOvr>
-    <a:masterClrMapping/>
-  </p:clrMapOvr>
-</p:sld>
-</file>
-
 <file path=ppt/slides/slide2.xml><?xml version="1.0" encoding="utf-8"?>
 <p:sld xmlns:a="http://schemas.openxmlformats.org/drawingml/2006/main" xmlns:r="http://schemas.openxmlformats.org/officeDocument/2006/relationships" xmlns:p="http://schemas.openxmlformats.org/presentationml/2006/main">
   <p:cSld>

</xml_diff>